<commit_message>
fixed some character encoding issues
</commit_message>
<xml_diff>
--- a/Introductory Python for Engineering Applications.pptx
+++ b/Introductory Python for Engineering Applications.pptx
@@ -6281,7 +6281,7 @@
           <a:p>
             <a:fld id="{98C65888-8C76-4709-9B01-0290F4523CEA}" type="datetimeFigureOut">
               <a:rPr lang="en-US" smtClean="0"/>
-              <a:t>10/10/2024</a:t>
+              <a:t>10/30/2024</a:t>
             </a:fld>
             <a:endParaRPr lang="en-US"/>
           </a:p>
@@ -11562,7 +11562,7 @@
           <a:p>
             <a:fld id="{06D8BB37-67E1-420F-B488-3DE93FA3DF1F}" type="datetimeFigureOut">
               <a:rPr lang="en-US" dirty="0"/>
-              <a:t>10/10/2024</a:t>
+              <a:t>10/30/2024</a:t>
             </a:fld>
             <a:endParaRPr lang="en-US" dirty="0"/>
           </a:p>
@@ -11768,7 +11768,7 @@
           <a:p>
             <a:fld id="{E4B96382-B15D-466F-9E7D-0603461872B7}" type="datetimeFigureOut">
               <a:rPr lang="en-US" dirty="0"/>
-              <a:t>10/10/2024</a:t>
+              <a:t>10/30/2024</a:t>
             </a:fld>
             <a:endParaRPr lang="en-US" dirty="0"/>
           </a:p>
@@ -11943,7 +11943,7 @@
           <a:p>
             <a:fld id="{218672AE-FC7B-40BA-8844-0693A2434617}" type="datetimeFigureOut">
               <a:rPr lang="en-US" dirty="0"/>
-              <a:t>10/10/2024</a:t>
+              <a:t>10/30/2024</a:t>
             </a:fld>
             <a:endParaRPr lang="en-US" dirty="0"/>
           </a:p>
@@ -12108,7 +12108,7 @@
           <a:p>
             <a:fld id="{3568EC8D-9508-4A2C-8FBC-4C089BA52EE5}" type="datetimeFigureOut">
               <a:rPr lang="en-US" dirty="0"/>
-              <a:t>10/10/2024</a:t>
+              <a:t>10/30/2024</a:t>
             </a:fld>
             <a:endParaRPr lang="en-US" dirty="0"/>
           </a:p>
@@ -12357,7 +12357,7 @@
           <a:p>
             <a:fld id="{DB7A1C89-C29A-4D79-B5A1-1F424905E9A1}" type="datetimeFigureOut">
               <a:rPr lang="en-US" dirty="0"/>
-              <a:t>10/10/2024</a:t>
+              <a:t>10/30/2024</a:t>
             </a:fld>
             <a:endParaRPr lang="en-US" dirty="0"/>
           </a:p>
@@ -12678,7 +12678,7 @@
           <a:p>
             <a:fld id="{57ECC248-0691-4AB1-BB8B-882D656FF160}" type="datetimeFigureOut">
               <a:rPr lang="en-US" dirty="0"/>
-              <a:t>10/10/2024</a:t>
+              <a:t>10/30/2024</a:t>
             </a:fld>
             <a:endParaRPr lang="en-US" dirty="0"/>
           </a:p>
@@ -13124,7 +13124,7 @@
           <a:p>
             <a:fld id="{D4E54B09-E178-460F-B46D-023FA9745608}" type="datetimeFigureOut">
               <a:rPr lang="en-US" dirty="0"/>
-              <a:t>10/10/2024</a:t>
+              <a:t>10/30/2024</a:t>
             </a:fld>
             <a:endParaRPr lang="en-US" dirty="0"/>
           </a:p>
@@ -13237,7 +13237,7 @@
           <a:p>
             <a:fld id="{6CD62E06-21B3-4A3D-A6C8-F0DFEB8AB04D}" type="datetimeFigureOut">
               <a:rPr lang="en-US" dirty="0"/>
-              <a:t>10/10/2024</a:t>
+              <a:t>10/30/2024</a:t>
             </a:fld>
             <a:endParaRPr lang="en-US" dirty="0"/>
           </a:p>
@@ -13327,7 +13327,7 @@
           <a:p>
             <a:fld id="{2CC7CC01-41FD-4607-B8B1-976991065B2D}" type="datetimeFigureOut">
               <a:rPr lang="en-US" dirty="0"/>
-              <a:t>10/10/2024</a:t>
+              <a:t>10/30/2024</a:t>
             </a:fld>
             <a:endParaRPr lang="en-US" dirty="0"/>
           </a:p>
@@ -13609,7 +13609,7 @@
           <a:p>
             <a:fld id="{6D6740A7-C153-476A-BA27-5BE657EA7C21}" type="datetimeFigureOut">
               <a:rPr lang="en-US" dirty="0"/>
-              <a:t>10/10/2024</a:t>
+              <a:t>10/30/2024</a:t>
             </a:fld>
             <a:endParaRPr lang="en-US" dirty="0"/>
           </a:p>
@@ -13922,7 +13922,7 @@
           <a:p>
             <a:fld id="{1C86C2EC-F3EA-4AFE-88D7-51A6BBFDBA8B}" type="datetimeFigureOut">
               <a:rPr lang="en-US" dirty="0"/>
-              <a:t>10/10/2024</a:t>
+              <a:t>10/30/2024</a:t>
             </a:fld>
             <a:endParaRPr lang="en-US" dirty="0"/>
           </a:p>
@@ -14169,7 +14169,7 @@
           <a:p>
             <a:fld id="{BF2EAB5F-78EB-45CA-9E26-D1BAA0AA6EEC}" type="datetimeFigureOut">
               <a:rPr lang="en-US" dirty="0"/>
-              <a:t>10/10/2024</a:t>
+              <a:t>10/30/2024</a:t>
             </a:fld>
             <a:endParaRPr lang="en-US" dirty="0"/>
           </a:p>
@@ -18008,7 +18008,7 @@
                 </a:solidFill>
                 <a:latin typeface="Bitstream Vera Sans Mono" panose="020B0609030804020204" pitchFamily="49" charset="0"/>
               </a:rPr>
-              <a:t> --global user.name “Your Name”</a:t>
+              <a:t> --global user.name "Your Name"</a:t>
             </a:r>
             <a:br>
               <a:rPr lang="en-US" sz="2000" dirty="0">
@@ -18063,7 +18063,29 @@
                 </a:solidFill>
                 <a:latin typeface="Bitstream Vera Sans Mono" panose="020B0609030804020204" pitchFamily="49" charset="0"/>
               </a:rPr>
-              <a:t> --global user.email “you@kent.edu”</a:t>
+              <a:t> --global </a:t>
+            </a:r>
+            <a:r>
+              <a:rPr lang="en-US" sz="2000" dirty="0" err="1">
+                <a:solidFill>
+                  <a:schemeClr val="tx1">
+                    <a:lumMod val="75000"/>
+                  </a:schemeClr>
+                </a:solidFill>
+                <a:latin typeface="Bitstream Vera Sans Mono" panose="020B0609030804020204" pitchFamily="49" charset="0"/>
+              </a:rPr>
+              <a:t>user.email</a:t>
+            </a:r>
+            <a:r>
+              <a:rPr lang="en-US" sz="2000" dirty="0">
+                <a:solidFill>
+                  <a:schemeClr val="tx1">
+                    <a:lumMod val="75000"/>
+                  </a:schemeClr>
+                </a:solidFill>
+                <a:latin typeface="Bitstream Vera Sans Mono" panose="020B0609030804020204" pitchFamily="49" charset="0"/>
+              </a:rPr>
+              <a:t> "you@kent.edu"</a:t>
             </a:r>
           </a:p>
         </p:txBody>
@@ -22741,7 +22763,7 @@
                 </a:solidFill>
                 <a:latin typeface="Bitstream Vera Sans Mono" panose="020B0609030804020204" pitchFamily="49" charset="0"/>
               </a:rPr>
-              <a:t> python –m pip install NumPy Matplotlib </a:t>
+              <a:t> python -m pip install NumPy Matplotlib </a:t>
             </a:r>
             <a:r>
               <a:rPr lang="en-US" sz="2000" dirty="0" err="1">
@@ -40632,7 +40654,7 @@
         <p:spPr>
           <a:xfrm>
             <a:off x="824550" y="1371600"/>
-            <a:ext cx="9692639" cy="5109091"/>
+            <a:ext cx="9692639" cy="5386090"/>
           </a:xfrm>
           <a:prstGeom prst="rect">
             <a:avLst/>
@@ -40866,6 +40888,23 @@
               <a:rPr lang="en-US" dirty="0"/>
               <a:t> of this slide deck and all source code files</a:t>
             </a:r>
+          </a:p>
+          <a:p>
+            <a:pPr marL="285750" indent="-285750">
+              <a:buFont typeface="Wingdings" panose="05000000000000000000" pitchFamily="2" charset="2"/>
+              <a:buChar char="v"/>
+            </a:pPr>
+            <a:r>
+              <a:rPr lang="en-US" dirty="0"/>
+              <a:t>This slide deck and all source code files available on GitHub at </a:t>
+            </a:r>
+            <a:r>
+              <a:rPr lang="en-US" dirty="0">
+                <a:hlinkClick r:id="rId14"/>
+              </a:rPr>
+              <a:t>KSU-AIAA/intro-py4engr</a:t>
+            </a:r>
+            <a:endParaRPr lang="en-US" dirty="0"/>
           </a:p>
           <a:p>
             <a:pPr marL="285750" indent="-285750">

</xml_diff>